<commit_message>
final versions of oct 26 slides
</commit_message>
<xml_diff>
--- a/PRESENTATIONS/2021-10-online-f2f/2021-10-26-WoT-F2F-Charters-McCool.pptx
+++ b/PRESENTATIONS/2021-10-online-f2f/2021-10-26-WoT-F2F-Charters-McCool.pptx
@@ -5,11 +5,13 @@
     <p:sldMasterId id="2147483648" r:id="rId1"/>
   </p:sldMasterIdLst>
   <p:notesMasterIdLst>
-    <p:notesMasterId r:id="rId4"/>
+    <p:notesMasterId r:id="rId6"/>
   </p:notesMasterIdLst>
   <p:sldIdLst>
     <p:sldId id="256" r:id="rId2"/>
     <p:sldId id="257" r:id="rId3"/>
+    <p:sldId id="258" r:id="rId4"/>
+    <p:sldId id="259" r:id="rId5"/>
   </p:sldIdLst>
   <p:sldSz cx="12192000" cy="6858000"/>
   <p:notesSz cx="6858000" cy="9144000"/>
@@ -4643,6 +4645,501 @@
     <p:extLst>
       <p:ext uri="{BB962C8B-B14F-4D97-AF65-F5344CB8AC3E}">
         <p14:creationId xmlns:p14="http://schemas.microsoft.com/office/powerpoint/2010/main" val="3400533408"/>
+      </p:ext>
+    </p:extLst>
+  </p:cSld>
+  <p:clrMapOvr>
+    <a:masterClrMapping/>
+  </p:clrMapOvr>
+</p:sld>
+</file>
+
+<file path=ppt/slides/slide3.xml><?xml version="1.0" encoding="utf-8"?>
+<p:sld xmlns:a="http://schemas.openxmlformats.org/drawingml/2006/main" xmlns:r="http://schemas.openxmlformats.org/officeDocument/2006/relationships" xmlns:p="http://schemas.openxmlformats.org/presentationml/2006/main">
+  <p:cSld>
+    <p:spTree>
+      <p:nvGrpSpPr>
+        <p:cNvPr id="1" name=""/>
+        <p:cNvGrpSpPr/>
+        <p:nvPr/>
+      </p:nvGrpSpPr>
+      <p:grpSpPr>
+        <a:xfrm>
+          <a:off x="0" y="0"/>
+          <a:ext cx="0" cy="0"/>
+          <a:chOff x="0" y="0"/>
+          <a:chExt cx="0" cy="0"/>
+        </a:xfrm>
+      </p:grpSpPr>
+      <p:sp>
+        <p:nvSpPr>
+          <p:cNvPr id="2" name="Title 1">
+            <a:extLst>
+              <a:ext uri="{FF2B5EF4-FFF2-40B4-BE49-F238E27FC236}">
+                <a16:creationId xmlns:a16="http://schemas.microsoft.com/office/drawing/2014/main" id="{C7F0F55D-D67D-814D-9D59-7A4A276F5F58}"/>
+              </a:ext>
+            </a:extLst>
+          </p:cNvPr>
+          <p:cNvSpPr>
+            <a:spLocks noGrp="1"/>
+          </p:cNvSpPr>
+          <p:nvPr>
+            <p:ph type="title"/>
+          </p:nvPr>
+        </p:nvSpPr>
+        <p:spPr/>
+        <p:txBody>
+          <a:bodyPr/>
+          <a:lstStyle/>
+          <a:p>
+            <a:r>
+              <a:rPr lang="en-US" dirty="0"/>
+              <a:t>Schedule Constraints</a:t>
+            </a:r>
+          </a:p>
+        </p:txBody>
+      </p:sp>
+      <p:sp>
+        <p:nvSpPr>
+          <p:cNvPr id="3" name="Content Placeholder 2">
+            <a:extLst>
+              <a:ext uri="{FF2B5EF4-FFF2-40B4-BE49-F238E27FC236}">
+                <a16:creationId xmlns:a16="http://schemas.microsoft.com/office/drawing/2014/main" id="{9CB249C4-BB76-4940-A8FD-6865C5AF1333}"/>
+              </a:ext>
+            </a:extLst>
+          </p:cNvPr>
+          <p:cNvSpPr>
+            <a:spLocks noGrp="1"/>
+          </p:cNvSpPr>
+          <p:nvPr>
+            <p:ph idx="1"/>
+          </p:nvPr>
+        </p:nvSpPr>
+        <p:spPr/>
+        <p:txBody>
+          <a:bodyPr/>
+          <a:lstStyle/>
+          <a:p>
+            <a:r>
+              <a:rPr lang="en-US" dirty="0"/>
+              <a:t>Current end of WG charter is Jan 31</a:t>
+            </a:r>
+          </a:p>
+          <a:p>
+            <a:r>
+              <a:rPr lang="en-US" dirty="0"/>
+              <a:t>6mo extension gives July 31</a:t>
+            </a:r>
+          </a:p>
+          <a:p>
+            <a:r>
+              <a:rPr lang="en-US" dirty="0"/>
+              <a:t>Milestone tool gives the following:</a:t>
+            </a:r>
+          </a:p>
+          <a:p>
+            <a:pPr lvl="1"/>
+            <a:r>
+              <a:rPr lang="en-US" dirty="0"/>
+              <a:t>REC: July 26</a:t>
+            </a:r>
+          </a:p>
+          <a:p>
+            <a:pPr lvl="1"/>
+            <a:r>
+              <a:rPr lang="en-US" dirty="0"/>
+              <a:t>PR: June 21</a:t>
+            </a:r>
+          </a:p>
+          <a:p>
+            <a:pPr lvl="1"/>
+            <a:r>
+              <a:rPr lang="en-US" dirty="0"/>
+              <a:t>CR: May 5</a:t>
+            </a:r>
+          </a:p>
+          <a:p>
+            <a:pPr lvl="1"/>
+            <a:r>
+              <a:rPr lang="en-US" dirty="0"/>
+              <a:t>FPWD: Jan 13 (may be relevant if we want to publish a TD 2.0 spec)</a:t>
+            </a:r>
+          </a:p>
+          <a:p>
+            <a:r>
+              <a:rPr lang="en-US" dirty="0"/>
+              <a:t>Prudence backs off PR/CR by 2mo to allow for "review slip":</a:t>
+            </a:r>
+          </a:p>
+          <a:p>
+            <a:pPr lvl="1"/>
+            <a:r>
+              <a:rPr lang="en-US" dirty="0"/>
+              <a:t>PR: mid-April</a:t>
+            </a:r>
+          </a:p>
+          <a:p>
+            <a:pPr lvl="1"/>
+            <a:r>
+              <a:rPr lang="en-US" dirty="0"/>
+              <a:t>CR: mid-March</a:t>
+            </a:r>
+          </a:p>
+          <a:p>
+            <a:pPr lvl="1"/>
+            <a:r>
+              <a:rPr lang="en-US" dirty="0"/>
+              <a:t>Implementations, </a:t>
+            </a:r>
+            <a:r>
+              <a:rPr lang="en-US" dirty="0" err="1"/>
+              <a:t>testfest</a:t>
+            </a:r>
+            <a:r>
+              <a:rPr lang="en-US" dirty="0"/>
+              <a:t>: mid-Feb; spec feature freeze/early review: Dec 31</a:t>
+            </a:r>
+          </a:p>
+          <a:p>
+            <a:pPr lvl="1"/>
+            <a:endParaRPr lang="en-US" dirty="0"/>
+          </a:p>
+        </p:txBody>
+      </p:sp>
+      <p:sp>
+        <p:nvSpPr>
+          <p:cNvPr id="4" name="Footer Placeholder 3">
+            <a:extLst>
+              <a:ext uri="{FF2B5EF4-FFF2-40B4-BE49-F238E27FC236}">
+                <a16:creationId xmlns:a16="http://schemas.microsoft.com/office/drawing/2014/main" id="{41F776E1-834E-2E4D-989D-6B3C1D54F289}"/>
+              </a:ext>
+            </a:extLst>
+          </p:cNvPr>
+          <p:cNvSpPr>
+            <a:spLocks noGrp="1"/>
+          </p:cNvSpPr>
+          <p:nvPr>
+            <p:ph type="ftr" sz="quarter" idx="11"/>
+          </p:nvPr>
+        </p:nvSpPr>
+        <p:spPr/>
+        <p:txBody>
+          <a:bodyPr/>
+          <a:lstStyle/>
+          <a:p>
+            <a:r>
+              <a:rPr lang="en-US"/>
+              <a:t>W3C Web of Things (WoT) WG/IG</a:t>
+            </a:r>
+          </a:p>
+        </p:txBody>
+      </p:sp>
+      <p:sp>
+        <p:nvSpPr>
+          <p:cNvPr id="5" name="Slide Number Placeholder 4">
+            <a:extLst>
+              <a:ext uri="{FF2B5EF4-FFF2-40B4-BE49-F238E27FC236}">
+                <a16:creationId xmlns:a16="http://schemas.microsoft.com/office/drawing/2014/main" id="{7C990CF3-36CE-D44B-97F8-2CB2ACB3B436}"/>
+              </a:ext>
+            </a:extLst>
+          </p:cNvPr>
+          <p:cNvSpPr>
+            <a:spLocks noGrp="1"/>
+          </p:cNvSpPr>
+          <p:nvPr>
+            <p:ph type="sldNum" sz="quarter" idx="12"/>
+          </p:nvPr>
+        </p:nvSpPr>
+        <p:spPr/>
+        <p:txBody>
+          <a:bodyPr/>
+          <a:lstStyle/>
+          <a:p>
+            <a:fld id="{055BDE2E-7167-1944-9FEE-E44668D91CB6}" type="slidenum">
+              <a:rPr lang="en-US" smtClean="0"/>
+              <a:t>3</a:t>
+            </a:fld>
+            <a:endParaRPr lang="en-US"/>
+          </a:p>
+        </p:txBody>
+      </p:sp>
+      <p:sp>
+        <p:nvSpPr>
+          <p:cNvPr id="6" name="Date Placeholder 5">
+            <a:extLst>
+              <a:ext uri="{FF2B5EF4-FFF2-40B4-BE49-F238E27FC236}">
+                <a16:creationId xmlns:a16="http://schemas.microsoft.com/office/drawing/2014/main" id="{8C99479D-812A-6049-BECE-7BF91BF0A835}"/>
+              </a:ext>
+            </a:extLst>
+          </p:cNvPr>
+          <p:cNvSpPr>
+            <a:spLocks noGrp="1"/>
+          </p:cNvSpPr>
+          <p:nvPr>
+            <p:ph type="dt" sz="half" idx="10"/>
+          </p:nvPr>
+        </p:nvSpPr>
+        <p:spPr/>
+        <p:txBody>
+          <a:bodyPr/>
+          <a:lstStyle/>
+          <a:p>
+            <a:fld id="{B929AB1E-7FD9-0A40-B7C0-508CCACB3E9A}" type="datetime1">
+              <a:rPr lang="en-CA" smtClean="0"/>
+              <a:t>2021-10-26</a:t>
+            </a:fld>
+            <a:endParaRPr lang="en-US"/>
+          </a:p>
+        </p:txBody>
+      </p:sp>
+    </p:spTree>
+    <p:extLst>
+      <p:ext uri="{BB962C8B-B14F-4D97-AF65-F5344CB8AC3E}">
+        <p14:creationId xmlns:p14="http://schemas.microsoft.com/office/powerpoint/2010/main" val="1276544400"/>
+      </p:ext>
+    </p:extLst>
+  </p:cSld>
+  <p:clrMapOvr>
+    <a:masterClrMapping/>
+  </p:clrMapOvr>
+</p:sld>
+</file>
+
+<file path=ppt/slides/slide4.xml><?xml version="1.0" encoding="utf-8"?>
+<p:sld xmlns:a="http://schemas.openxmlformats.org/drawingml/2006/main" xmlns:r="http://schemas.openxmlformats.org/officeDocument/2006/relationships" xmlns:p="http://schemas.openxmlformats.org/presentationml/2006/main">
+  <p:cSld>
+    <p:spTree>
+      <p:nvGrpSpPr>
+        <p:cNvPr id="1" name=""/>
+        <p:cNvGrpSpPr/>
+        <p:nvPr/>
+      </p:nvGrpSpPr>
+      <p:grpSpPr>
+        <a:xfrm>
+          <a:off x="0" y="0"/>
+          <a:ext cx="0" cy="0"/>
+          <a:chOff x="0" y="0"/>
+          <a:chExt cx="0" cy="0"/>
+        </a:xfrm>
+      </p:grpSpPr>
+      <p:sp>
+        <p:nvSpPr>
+          <p:cNvPr id="2" name="Title 1">
+            <a:extLst>
+              <a:ext uri="{FF2B5EF4-FFF2-40B4-BE49-F238E27FC236}">
+                <a16:creationId xmlns:a16="http://schemas.microsoft.com/office/drawing/2014/main" id="{E4A98FE9-23E1-DE4E-B56D-90ACDCC05094}"/>
+              </a:ext>
+            </a:extLst>
+          </p:cNvPr>
+          <p:cNvSpPr>
+            <a:spLocks noGrp="1"/>
+          </p:cNvSpPr>
+          <p:nvPr>
+            <p:ph type="title"/>
+          </p:nvPr>
+        </p:nvSpPr>
+        <p:spPr/>
+        <p:txBody>
+          <a:bodyPr/>
+          <a:lstStyle/>
+          <a:p>
+            <a:r>
+              <a:rPr lang="en-US" dirty="0"/>
+              <a:t>Revised Plan for Normative Deliverables</a:t>
+            </a:r>
+          </a:p>
+        </p:txBody>
+      </p:sp>
+      <p:sp>
+        <p:nvSpPr>
+          <p:cNvPr id="3" name="Content Placeholder 2">
+            <a:extLst>
+              <a:ext uri="{FF2B5EF4-FFF2-40B4-BE49-F238E27FC236}">
+                <a16:creationId xmlns:a16="http://schemas.microsoft.com/office/drawing/2014/main" id="{50A08942-395A-A643-96BE-EDC7E76E0B9F}"/>
+              </a:ext>
+            </a:extLst>
+          </p:cNvPr>
+          <p:cNvSpPr>
+            <a:spLocks noGrp="1"/>
+          </p:cNvSpPr>
+          <p:nvPr>
+            <p:ph idx="1"/>
+          </p:nvPr>
+        </p:nvSpPr>
+        <p:spPr/>
+        <p:txBody>
+          <a:bodyPr/>
+          <a:lstStyle/>
+          <a:p>
+            <a:r>
+              <a:rPr lang="en-US" dirty="0"/>
+              <a:t>Thing Description</a:t>
+            </a:r>
+          </a:p>
+          <a:p>
+            <a:pPr lvl="1"/>
+            <a:r>
+              <a:rPr lang="en-US" dirty="0"/>
+              <a:t>1.1 </a:t>
+            </a:r>
+          </a:p>
+          <a:p>
+            <a:pPr lvl="2"/>
+            <a:r>
+              <a:rPr lang="en-US" dirty="0"/>
+              <a:t>May need to rollback some things for KISS, compatibility (e.g. optional forms)</a:t>
+            </a:r>
+          </a:p>
+          <a:p>
+            <a:pPr lvl="2"/>
+            <a:r>
+              <a:rPr lang="en-US" dirty="0"/>
+              <a:t>Decide on rollback features by end of Nov</a:t>
+            </a:r>
+          </a:p>
+          <a:p>
+            <a:pPr lvl="2"/>
+            <a:r>
+              <a:rPr lang="en-US" dirty="0"/>
+              <a:t>Aim for feature freeze Dec 15, to give time for Profiles to catch up by Jan 31</a:t>
+            </a:r>
+          </a:p>
+          <a:p>
+            <a:pPr lvl="1"/>
+            <a:r>
+              <a:rPr lang="en-US" dirty="0"/>
+              <a:t>2.0</a:t>
+            </a:r>
+          </a:p>
+          <a:p>
+            <a:pPr lvl="2"/>
+            <a:r>
+              <a:rPr lang="en-US" dirty="0"/>
+              <a:t>FPWD deadline is Jan 13</a:t>
+            </a:r>
+          </a:p>
+          <a:p>
+            <a:pPr lvl="2"/>
+            <a:r>
+              <a:rPr lang="en-US" dirty="0"/>
+              <a:t>Probably not feasible, will have to </a:t>
+            </a:r>
+            <a:r>
+              <a:rPr lang="en-US"/>
+              <a:t>defer to next charter</a:t>
+            </a:r>
+            <a:endParaRPr lang="en-US" dirty="0"/>
+          </a:p>
+          <a:p>
+            <a:r>
+              <a:rPr lang="en-US" dirty="0"/>
+              <a:t>Architecture</a:t>
+            </a:r>
+          </a:p>
+          <a:p>
+            <a:r>
+              <a:rPr lang="en-US" dirty="0"/>
+              <a:t>Discovery</a:t>
+            </a:r>
+          </a:p>
+          <a:p>
+            <a:r>
+              <a:rPr lang="en-US" dirty="0"/>
+              <a:t>Profiles</a:t>
+            </a:r>
+          </a:p>
+        </p:txBody>
+      </p:sp>
+      <p:sp>
+        <p:nvSpPr>
+          <p:cNvPr id="4" name="Footer Placeholder 3">
+            <a:extLst>
+              <a:ext uri="{FF2B5EF4-FFF2-40B4-BE49-F238E27FC236}">
+                <a16:creationId xmlns:a16="http://schemas.microsoft.com/office/drawing/2014/main" id="{A0FCC705-006A-374D-9C80-5DF4D44C42EA}"/>
+              </a:ext>
+            </a:extLst>
+          </p:cNvPr>
+          <p:cNvSpPr>
+            <a:spLocks noGrp="1"/>
+          </p:cNvSpPr>
+          <p:nvPr>
+            <p:ph type="ftr" sz="quarter" idx="11"/>
+          </p:nvPr>
+        </p:nvSpPr>
+        <p:spPr/>
+        <p:txBody>
+          <a:bodyPr/>
+          <a:lstStyle/>
+          <a:p>
+            <a:r>
+              <a:rPr lang="en-US"/>
+              <a:t>W3C Web of Things (WoT) WG/IG</a:t>
+            </a:r>
+          </a:p>
+        </p:txBody>
+      </p:sp>
+      <p:sp>
+        <p:nvSpPr>
+          <p:cNvPr id="5" name="Slide Number Placeholder 4">
+            <a:extLst>
+              <a:ext uri="{FF2B5EF4-FFF2-40B4-BE49-F238E27FC236}">
+                <a16:creationId xmlns:a16="http://schemas.microsoft.com/office/drawing/2014/main" id="{30AE4851-1185-5646-8318-090D4BEAFDD3}"/>
+              </a:ext>
+            </a:extLst>
+          </p:cNvPr>
+          <p:cNvSpPr>
+            <a:spLocks noGrp="1"/>
+          </p:cNvSpPr>
+          <p:nvPr>
+            <p:ph type="sldNum" sz="quarter" idx="12"/>
+          </p:nvPr>
+        </p:nvSpPr>
+        <p:spPr/>
+        <p:txBody>
+          <a:bodyPr/>
+          <a:lstStyle/>
+          <a:p>
+            <a:fld id="{055BDE2E-7167-1944-9FEE-E44668D91CB6}" type="slidenum">
+              <a:rPr lang="en-US" smtClean="0"/>
+              <a:t>4</a:t>
+            </a:fld>
+            <a:endParaRPr lang="en-US"/>
+          </a:p>
+        </p:txBody>
+      </p:sp>
+      <p:sp>
+        <p:nvSpPr>
+          <p:cNvPr id="6" name="Date Placeholder 5">
+            <a:extLst>
+              <a:ext uri="{FF2B5EF4-FFF2-40B4-BE49-F238E27FC236}">
+                <a16:creationId xmlns:a16="http://schemas.microsoft.com/office/drawing/2014/main" id="{A0AC627E-3C87-1046-80A5-09847BE21FE3}"/>
+              </a:ext>
+            </a:extLst>
+          </p:cNvPr>
+          <p:cNvSpPr>
+            <a:spLocks noGrp="1"/>
+          </p:cNvSpPr>
+          <p:nvPr>
+            <p:ph type="dt" sz="half" idx="10"/>
+          </p:nvPr>
+        </p:nvSpPr>
+        <p:spPr/>
+        <p:txBody>
+          <a:bodyPr/>
+          <a:lstStyle/>
+          <a:p>
+            <a:fld id="{B929AB1E-7FD9-0A40-B7C0-508CCACB3E9A}" type="datetime1">
+              <a:rPr lang="en-CA" smtClean="0"/>
+              <a:t>2021-10-26</a:t>
+            </a:fld>
+            <a:endParaRPr lang="en-US"/>
+          </a:p>
+        </p:txBody>
+      </p:sp>
+    </p:spTree>
+    <p:extLst>
+      <p:ext uri="{BB962C8B-B14F-4D97-AF65-F5344CB8AC3E}">
+        <p14:creationId xmlns:p14="http://schemas.microsoft.com/office/powerpoint/2010/main" val="2833999106"/>
       </p:ext>
     </p:extLst>
   </p:cSld>

</xml_diff>